<commit_message>
feat(workflow): add missing release ci action
</commit_message>
<xml_diff>
--- a/img/ci-workflow.pptx
+++ b/img/ci-workflow.pptx
@@ -4598,6 +4598,36 @@
             <a:r>
               <a:rPr lang="fr-FR" sz="1200" dirty="0" smtClean="0"/>
               <a:t>notify</a:t>
+            </a:r>
+            <a:endParaRPr lang="fr-FR" sz="1200" dirty="0"/>
+          </a:p>
+        </p:txBody>
+      </p:sp>
+      <p:sp>
+        <p:nvSpPr>
+          <p:cNvPr id="44" name="ZoneTexte 43"/>
+          <p:cNvSpPr txBox="1"/>
+          <p:nvPr/>
+        </p:nvSpPr>
+        <p:spPr>
+          <a:xfrm>
+            <a:off x="6337172" y="2244843"/>
+            <a:ext cx="782703" cy="276999"/>
+          </a:xfrm>
+          <a:prstGeom prst="rect">
+            <a:avLst/>
+          </a:prstGeom>
+          <a:noFill/>
+        </p:spPr>
+        <p:txBody>
+          <a:bodyPr wrap="square" rtlCol="0">
+            <a:spAutoFit/>
+          </a:bodyPr>
+          <a:lstStyle/>
+          <a:p>
+            <a:r>
+              <a:rPr lang="fr-FR" sz="1200" dirty="0" smtClean="0"/>
+              <a:t>release</a:t>
             </a:r>
             <a:endParaRPr lang="fr-FR" sz="1200" dirty="0"/>
           </a:p>

</xml_diff>